<commit_message>
A4CLI is now fully documented.
</commit_message>
<xml_diff>
--- a/documentation/GettingStarted.pptx
+++ b/documentation/GettingStarted.pptx
@@ -30,6 +30,7 @@
     <p:sldId id="278" r:id="rId24"/>
     <p:sldId id="280" r:id="rId25"/>
     <p:sldId id="279" r:id="rId26"/>
+    <p:sldId id="281" r:id="rId27"/>
   </p:sldIdLst>
   <p:sldSz cx="9144000" cy="6858000" type="screen4x3"/>
   <p:notesSz cx="6858000" cy="9144000"/>
@@ -170,6 +171,7 @@
             <p14:sldId id="278"/>
             <p14:sldId id="280"/>
             <p14:sldId id="279"/>
+            <p14:sldId id="281"/>
           </p14:sldIdLst>
         </p14:section>
       </p14:sectionLst>
@@ -1751,10 +1753,10 @@
     <dgm:cxn modelId="{3FF183A6-30A9-EC49-89B9-83CCB247CFCD}" srcId="{143FA331-207A-FB44-95B6-33975FD87FDC}" destId="{4FE56B68-5A6E-1741-8256-4428C89201C0}" srcOrd="0" destOrd="0" parTransId="{E31B190F-4DE5-5A47-A735-9266B86890AE}" sibTransId="{9331B069-0CB4-F843-A452-481B2ACC4009}"/>
     <dgm:cxn modelId="{286E8DB6-F861-7F4E-AFAC-F03FCCB0A0D3}" type="presOf" srcId="{143FA331-207A-FB44-95B6-33975FD87FDC}" destId="{5B8A5EAC-F374-8749-ABFB-442563EAAA49}" srcOrd="0" destOrd="1" presId="urn:microsoft.com/office/officeart/2005/8/layout/chevron2"/>
     <dgm:cxn modelId="{11C55362-2A44-EB4D-BE07-59EBAB4A64B7}" type="presOf" srcId="{4F196CFB-70BA-7341-A499-D6F7E784872D}" destId="{B65F8B5F-B0C6-6844-9F2E-16D5C3D21999}" srcOrd="0" destOrd="1" presId="urn:microsoft.com/office/officeart/2005/8/layout/chevron2"/>
+    <dgm:cxn modelId="{779AD7BF-EE01-CE43-B1BE-F021FD2D2BC8}" type="presOf" srcId="{E2F11381-B3FC-A144-ABCB-4102E8B32BA4}" destId="{B3339FDC-AA9E-B14B-AE30-CEA9C6CDCA47}" srcOrd="0" destOrd="0" presId="urn:microsoft.com/office/officeart/2005/8/layout/chevron2"/>
     <dgm:cxn modelId="{97D34E1F-5066-D041-BE46-0216299020F9}" srcId="{024D6ECA-8252-A141-A60B-F7DD96BC2C13}" destId="{3454FA1B-1351-2244-80FD-1D8568524E12}" srcOrd="0" destOrd="0" parTransId="{B484C220-BD2D-9544-B96A-61A8384DE947}" sibTransId="{2971710F-192F-AA41-950B-62A904AD87BC}"/>
-    <dgm:cxn modelId="{779AD7BF-EE01-CE43-B1BE-F021FD2D2BC8}" type="presOf" srcId="{E2F11381-B3FC-A144-ABCB-4102E8B32BA4}" destId="{B3339FDC-AA9E-B14B-AE30-CEA9C6CDCA47}" srcOrd="0" destOrd="0" presId="urn:microsoft.com/office/officeart/2005/8/layout/chevron2"/>
+    <dgm:cxn modelId="{1FB634A8-D201-1549-8D1C-98357D8F405F}" srcId="{E2F11381-B3FC-A144-ABCB-4102E8B32BA4}" destId="{941FB597-D415-D841-A3D3-4D74358CFD6F}" srcOrd="2" destOrd="0" parTransId="{C4E8DE3A-597F-AB4B-9C63-79C6B0610320}" sibTransId="{000C6CC6-1A7C-D842-B2E2-6C8B672C1408}"/>
     <dgm:cxn modelId="{C6B1CC16-4293-5D4F-92A9-4BFF194783B9}" srcId="{226CFD69-A1B4-7E4D-9319-4B2B9840834C}" destId="{143FA331-207A-FB44-95B6-33975FD87FDC}" srcOrd="1" destOrd="0" parTransId="{9FEB79DF-26E6-6F4C-BAB3-7CB6DE265A1F}" sibTransId="{C8E669D9-063E-3F47-9154-CB61E8373399}"/>
-    <dgm:cxn modelId="{1FB634A8-D201-1549-8D1C-98357D8F405F}" srcId="{E2F11381-B3FC-A144-ABCB-4102E8B32BA4}" destId="{941FB597-D415-D841-A3D3-4D74358CFD6F}" srcOrd="2" destOrd="0" parTransId="{C4E8DE3A-597F-AB4B-9C63-79C6B0610320}" sibTransId="{000C6CC6-1A7C-D842-B2E2-6C8B672C1408}"/>
     <dgm:cxn modelId="{A74A3EA1-9571-0B4C-831D-DDA9275F3EAD}" type="presOf" srcId="{941FB597-D415-D841-A3D3-4D74358CFD6F}" destId="{DE821443-E1FD-AE44-98C7-5BBF398C7942}" srcOrd="0" destOrd="0" presId="urn:microsoft.com/office/officeart/2005/8/layout/chevron2"/>
     <dgm:cxn modelId="{249CAB7C-8B78-CA4A-BF80-19FC5138DC81}" type="presOf" srcId="{AEFEEA83-8B56-E040-A17F-F84A72261900}" destId="{9E6A5364-8321-5349-BF23-21D46AD7929D}" srcOrd="0" destOrd="0" presId="urn:microsoft.com/office/officeart/2005/8/layout/chevron2"/>
     <dgm:cxn modelId="{32E943ED-5158-7E46-B7B4-EB189C5A3A40}" srcId="{E2F11381-B3FC-A144-ABCB-4102E8B32BA4}" destId="{226CFD69-A1B4-7E4D-9319-4B2B9840834C}" srcOrd="0" destOrd="0" parTransId="{AD751730-F994-EE44-A23A-27263FDB4E17}" sibTransId="{11C231BE-0A49-704E-B86E-7BC92C4097F5}"/>
@@ -5612,7 +5614,7 @@
             <a:fld id="{E30E2307-1E40-4E12-8716-25BFDA8E7013}" type="datetime1">
               <a:rPr lang="en-US" smtClean="0"/>
               <a:pPr/>
-              <a:t>19/08/15</a:t>
+              <a:t>20/08/15</a:t>
             </a:fld>
             <a:endParaRPr lang="en-US"/>
           </a:p>
@@ -5795,7 +5797,7 @@
             <a:fld id="{E5CFCF5A-EA79-452C-A52C-1A2668C2E7DF}" type="datetime1">
               <a:rPr lang="en-US" smtClean="0"/>
               <a:pPr/>
-              <a:t>19/08/15</a:t>
+              <a:t>20/08/15</a:t>
             </a:fld>
             <a:endParaRPr lang="en-US"/>
           </a:p>
@@ -5948,7 +5950,7 @@
             <a:fld id="{2E5C4C28-BD4B-4892-9A2D-6E19BD753A9A}" type="datetime1">
               <a:rPr lang="en-US" smtClean="0"/>
               <a:pPr/>
-              <a:t>19/08/15</a:t>
+              <a:t>20/08/15</a:t>
             </a:fld>
             <a:endParaRPr lang="en-US"/>
           </a:p>
@@ -7776,7 +7778,7 @@
             <a:fld id="{61FD9D02-426E-46C9-9EE9-0DE1EF8B2838}" type="datetime1">
               <a:rPr lang="en-US" smtClean="0"/>
               <a:pPr/>
-              <a:t>19/08/15</a:t>
+              <a:t>20/08/15</a:t>
             </a:fld>
             <a:endParaRPr lang="en-US"/>
           </a:p>
@@ -9648,7 +9650,7 @@
             <a:fld id="{7B8AEBBE-F8B2-42CF-9895-E86A608384EB}" type="datetime1">
               <a:rPr lang="en-US" smtClean="0"/>
               <a:pPr/>
-              <a:t>19/08/15</a:t>
+              <a:t>20/08/15</a:t>
             </a:fld>
             <a:endParaRPr lang="en-US"/>
           </a:p>
@@ -9763,7 +9765,7 @@
             <a:fld id="{E1FAA6B6-10E5-4810-BC9F-DA72D8452E73}" type="datetime1">
               <a:rPr lang="en-US" smtClean="0"/>
               <a:pPr/>
-              <a:t>19/08/15</a:t>
+              <a:t>20/08/15</a:t>
             </a:fld>
             <a:endParaRPr lang="en-US"/>
           </a:p>
@@ -10306,7 +10308,7 @@
             <a:fld id="{6D18D072-EF12-4AA2-BD71-ABC68B06D0E2}" type="datetime1">
               <a:rPr lang="en-US" smtClean="0"/>
               <a:pPr/>
-              <a:t>19/08/15</a:t>
+              <a:t>20/08/15</a:t>
             </a:fld>
             <a:endParaRPr lang="en-US"/>
           </a:p>
@@ -10421,7 +10423,7 @@
             <a:fld id="{B8CDBF60-6CC3-4B74-A60D-3486985E4346}" type="datetime1">
               <a:rPr lang="en-US" smtClean="0"/>
               <a:pPr/>
-              <a:t>19/08/15</a:t>
+              <a:t>20/08/15</a:t>
             </a:fld>
             <a:endParaRPr lang="en-US"/>
           </a:p>
@@ -12134,7 +12136,7 @@
             <a:fld id="{22714818-984F-4759-BF72-A33BDC1963BD}" type="datetime1">
               <a:rPr lang="en-US" smtClean="0"/>
               <a:pPr/>
-              <a:t>19/08/15</a:t>
+              <a:t>20/08/15</a:t>
             </a:fld>
             <a:endParaRPr lang="en-US"/>
           </a:p>
@@ -12287,7 +12289,7 @@
             <a:fld id="{9EA7E191-5F94-4FC1-B823-BD7CABF7FA06}" type="datetime1">
               <a:rPr lang="en-US" smtClean="0"/>
               <a:pPr/>
-              <a:t>19/08/15</a:t>
+              <a:t>20/08/15</a:t>
             </a:fld>
             <a:endParaRPr lang="en-US"/>
           </a:p>
@@ -15904,7 +15906,7 @@
             <a:fld id="{88856D55-EFBE-4F9B-8A5F-09D42CA22A9B}" type="datetime1">
               <a:rPr lang="en-US" smtClean="0"/>
               <a:pPr/>
-              <a:t>19/08/15</a:t>
+              <a:t>20/08/15</a:t>
             </a:fld>
             <a:endParaRPr lang="en-US"/>
           </a:p>
@@ -17765,7 +17767,7 @@
             <a:fld id="{9D1D110F-3F4E-48D9-B8AA-5D0E825AFDBA}" type="datetime1">
               <a:rPr lang="en-US" smtClean="0"/>
               <a:pPr/>
-              <a:t>19/08/15</a:t>
+              <a:t>20/08/15</a:t>
             </a:fld>
             <a:endParaRPr lang="en-US"/>
           </a:p>
@@ -18649,11 +18651,7 @@
           <a:p>
             <a:r>
               <a:rPr lang="en-US" dirty="0" smtClean="0"/>
-              <a:t>Component: </a:t>
-            </a:r>
-            <a:r>
-              <a:rPr lang="en-US" dirty="0" smtClean="0"/>
-              <a:t>Backend </a:t>
+              <a:t>Component: Backend </a:t>
             </a:r>
             <a:endParaRPr lang="en-US" dirty="0"/>
           </a:p>
@@ -19922,15 +19920,7 @@
             <a:pPr lvl="1"/>
             <a:r>
               <a:rPr lang="en-US" dirty="0" smtClean="0"/>
-              <a:t>Could be used as a basis to prepare cloud </a:t>
-            </a:r>
-            <a:r>
-              <a:rPr lang="en-US" dirty="0" smtClean="0"/>
-              <a:t>based model analysis </a:t>
-            </a:r>
-            <a:r>
-              <a:rPr lang="en-US" dirty="0" smtClean="0"/>
-              <a:t>experiments</a:t>
+              <a:t>Could be used as a basis to prepare cloud based model analysis experiments</a:t>
             </a:r>
           </a:p>
         </p:txBody>
@@ -20749,6 +20739,108 @@
     <p:extLst>
       <p:ext uri="{BB962C8B-B14F-4D97-AF65-F5344CB8AC3E}">
         <p14:creationId xmlns:p14="http://schemas.microsoft.com/office/powerpoint/2010/main" val="875038798"/>
+      </p:ext>
+    </p:extLst>
+  </p:cSld>
+  <p:clrMapOvr>
+    <a:masterClrMapping/>
+  </p:clrMapOvr>
+</p:sld>
+</file>
+
+<file path=ppt/slides/slide26.xml><?xml version="1.0" encoding="utf-8"?>
+<p:sld xmlns:a="http://schemas.openxmlformats.org/drawingml/2006/main" xmlns:r="http://schemas.openxmlformats.org/officeDocument/2006/relationships" xmlns:p="http://schemas.openxmlformats.org/presentationml/2006/main">
+  <p:cSld>
+    <p:spTree>
+      <p:nvGrpSpPr>
+        <p:cNvPr id="1" name=""/>
+        <p:cNvGrpSpPr/>
+        <p:nvPr/>
+      </p:nvGrpSpPr>
+      <p:grpSpPr>
+        <a:xfrm>
+          <a:off x="0" y="0"/>
+          <a:ext cx="0" cy="0"/>
+          <a:chOff x="0" y="0"/>
+          <a:chExt cx="0" cy="0"/>
+        </a:xfrm>
+      </p:grpSpPr>
+      <p:sp>
+        <p:nvSpPr>
+          <p:cNvPr id="2" name="Espace réservé du contenu 1"/>
+          <p:cNvSpPr>
+            <a:spLocks noGrp="1"/>
+          </p:cNvSpPr>
+          <p:nvPr>
+            <p:ph idx="1"/>
+          </p:nvPr>
+        </p:nvSpPr>
+        <p:spPr/>
+        <p:txBody>
+          <a:bodyPr/>
+          <a:lstStyle/>
+          <a:p>
+            <a:r>
+              <a:rPr lang="en-US" dirty="0" smtClean="0"/>
+              <a:t>Instead of using </a:t>
+            </a:r>
+            <a:r>
+              <a:rPr lang="en-US" dirty="0" err="1" smtClean="0"/>
+              <a:t>Graphviz</a:t>
+            </a:r>
+            <a:r>
+              <a:rPr lang="en-US" dirty="0" smtClean="0"/>
+              <a:t>, one might want to investigate Jung</a:t>
+            </a:r>
+          </a:p>
+          <a:p>
+            <a:pPr lvl="1"/>
+            <a:r>
+              <a:rPr lang="en-US" smtClean="0"/>
+              <a:t>For instance using this DSL (</a:t>
+            </a:r>
+            <a:r>
+              <a:rPr lang="en-US" dirty="0"/>
+              <a:t>http://</a:t>
+            </a:r>
+            <a:r>
+              <a:rPr lang="en-US" dirty="0" err="1"/>
+              <a:t>tinyurl.com</a:t>
+            </a:r>
+            <a:r>
+              <a:rPr lang="en-US" dirty="0"/>
+              <a:t>/ntbmaa8)</a:t>
+            </a:r>
+          </a:p>
+        </p:txBody>
+      </p:sp>
+      <p:sp>
+        <p:nvSpPr>
+          <p:cNvPr id="3" name="Titre 2"/>
+          <p:cNvSpPr>
+            <a:spLocks noGrp="1"/>
+          </p:cNvSpPr>
+          <p:nvPr>
+            <p:ph type="title"/>
+          </p:nvPr>
+        </p:nvSpPr>
+        <p:spPr/>
+        <p:txBody>
+          <a:bodyPr/>
+          <a:lstStyle/>
+          <a:p>
+            <a:r>
+              <a:rPr lang="en-US" dirty="0" smtClean="0"/>
+              <a:t>Alternatives</a:t>
+            </a:r>
+            <a:endParaRPr lang="en-US" dirty="0"/>
+          </a:p>
+        </p:txBody>
+      </p:sp>
+    </p:spTree>
+    <p:extLst>
+      <p:ext uri="{BB962C8B-B14F-4D97-AF65-F5344CB8AC3E}">
+        <p14:creationId xmlns:p14="http://schemas.microsoft.com/office/powerpoint/2010/main" val="4266206610"/>
       </p:ext>
     </p:extLst>
   </p:cSld>
@@ -21641,11 +21733,7 @@
           <a:p>
             <a:r>
               <a:rPr lang="en-US" dirty="0" smtClean="0"/>
-              <a:t>Component: </a:t>
-            </a:r>
-            <a:r>
-              <a:rPr lang="en-US" dirty="0" smtClean="0"/>
-              <a:t>A4cli</a:t>
+              <a:t>Component: A4cli</a:t>
             </a:r>
             <a:endParaRPr lang="en-US" dirty="0"/>
           </a:p>

</xml_diff>